<commit_message>
Merged codes and updated figures
</commit_message>
<xml_diff>
--- a/Pilot/Planning/PhaseFlip_TrialSplit.pptx
+++ b/Pilot/Planning/PhaseFlip_TrialSplit.pptx
@@ -5,7 +5,7 @@
     <p:sldMasterId id="2147483648" r:id="rId1"/>
   </p:sldMasterIdLst>
   <p:notesMasterIdLst>
-    <p:notesMasterId r:id="rId7"/>
+    <p:notesMasterId r:id="rId8"/>
   </p:notesMasterIdLst>
   <p:sldIdLst>
     <p:sldId id="256" r:id="rId2"/>
@@ -13,6 +13,7 @@
     <p:sldId id="258" r:id="rId4"/>
     <p:sldId id="259" r:id="rId5"/>
     <p:sldId id="260" r:id="rId6"/>
+    <p:sldId id="261" r:id="rId7"/>
   </p:sldIdLst>
   <p:sldSz cx="12192000" cy="6858000"/>
   <p:notesSz cx="6858000" cy="9144000"/>
@@ -201,7 +202,7 @@
           <a:p>
             <a:fld id="{F2AB97BF-80A0-4985-96E7-1F4627227B6E}" type="datetimeFigureOut">
               <a:rPr lang="en-US" smtClean="0"/>
-              <a:t>11/20/2024</a:t>
+              <a:t>12/13/2024</a:t>
             </a:fld>
             <a:endParaRPr lang="en-US"/>
           </a:p>
@@ -639,6 +640,90 @@
 </p:notes>
 </file>
 
+<file path=ppt/notesSlides/notesSlide3.xml><?xml version="1.0" encoding="utf-8"?>
+<p:notes xmlns:a="http://schemas.openxmlformats.org/drawingml/2006/main" xmlns:r="http://schemas.openxmlformats.org/officeDocument/2006/relationships" xmlns:p="http://schemas.openxmlformats.org/presentationml/2006/main">
+  <p:cSld>
+    <p:spTree>
+      <p:nvGrpSpPr>
+        <p:cNvPr id="1" name=""/>
+        <p:cNvGrpSpPr/>
+        <p:nvPr/>
+      </p:nvGrpSpPr>
+      <p:grpSpPr>
+        <a:xfrm>
+          <a:off x="0" y="0"/>
+          <a:ext cx="0" cy="0"/>
+          <a:chOff x="0" y="0"/>
+          <a:chExt cx="0" cy="0"/>
+        </a:xfrm>
+      </p:grpSpPr>
+      <p:sp>
+        <p:nvSpPr>
+          <p:cNvPr id="2" name="Slide Image Placeholder 1"/>
+          <p:cNvSpPr>
+            <a:spLocks noGrp="1" noRot="1" noChangeAspect="1"/>
+          </p:cNvSpPr>
+          <p:nvPr>
+            <p:ph type="sldImg"/>
+          </p:nvPr>
+        </p:nvSpPr>
+        <p:spPr/>
+      </p:sp>
+      <p:sp>
+        <p:nvSpPr>
+          <p:cNvPr id="3" name="Notes Placeholder 2"/>
+          <p:cNvSpPr>
+            <a:spLocks noGrp="1"/>
+          </p:cNvSpPr>
+          <p:nvPr>
+            <p:ph type="body" idx="1"/>
+          </p:nvPr>
+        </p:nvSpPr>
+        <p:spPr/>
+        <p:txBody>
+          <a:bodyPr/>
+          <a:lstStyle/>
+          <a:p>
+            <a:endParaRPr lang="en-US"/>
+          </a:p>
+        </p:txBody>
+      </p:sp>
+      <p:sp>
+        <p:nvSpPr>
+          <p:cNvPr id="4" name="Slide Number Placeholder 3"/>
+          <p:cNvSpPr>
+            <a:spLocks noGrp="1"/>
+          </p:cNvSpPr>
+          <p:nvPr>
+            <p:ph type="sldNum" sz="quarter" idx="5"/>
+          </p:nvPr>
+        </p:nvSpPr>
+        <p:spPr/>
+        <p:txBody>
+          <a:bodyPr/>
+          <a:lstStyle/>
+          <a:p>
+            <a:fld id="{B1FA3A32-9F3B-43D0-B5DE-FE2EEB4F4E9E}" type="slidenum">
+              <a:rPr lang="en-US" smtClean="0"/>
+              <a:t>6</a:t>
+            </a:fld>
+            <a:endParaRPr lang="en-US"/>
+          </a:p>
+        </p:txBody>
+      </p:sp>
+    </p:spTree>
+    <p:extLst>
+      <p:ext uri="{BB962C8B-B14F-4D97-AF65-F5344CB8AC3E}">
+        <p14:creationId xmlns:p14="http://schemas.microsoft.com/office/powerpoint/2010/main" val="3028544713"/>
+      </p:ext>
+    </p:extLst>
+  </p:cSld>
+  <p:clrMapOvr>
+    <a:masterClrMapping/>
+  </p:clrMapOvr>
+</p:notes>
+</file>
+
 <file path=ppt/slideLayouts/slideLayout1.xml><?xml version="1.0" encoding="utf-8"?>
 <p:sldLayout xmlns:a="http://schemas.openxmlformats.org/drawingml/2006/main" xmlns:r="http://schemas.openxmlformats.org/officeDocument/2006/relationships" xmlns:p="http://schemas.openxmlformats.org/presentationml/2006/main" type="title" preserve="1">
   <p:cSld name="Title Slide">
@@ -786,7 +871,7 @@
           <a:p>
             <a:fld id="{6AD31072-9D89-4BEC-8866-A84FEAA74BA9}" type="datetimeFigureOut">
               <a:rPr lang="en-US" smtClean="0"/>
-              <a:t>11/20/2024</a:t>
+              <a:t>12/13/2024</a:t>
             </a:fld>
             <a:endParaRPr lang="en-US"/>
           </a:p>
@@ -984,7 +1069,7 @@
           <a:p>
             <a:fld id="{6AD31072-9D89-4BEC-8866-A84FEAA74BA9}" type="datetimeFigureOut">
               <a:rPr lang="en-US" smtClean="0"/>
-              <a:t>11/20/2024</a:t>
+              <a:t>12/13/2024</a:t>
             </a:fld>
             <a:endParaRPr lang="en-US"/>
           </a:p>
@@ -1192,7 +1277,7 @@
           <a:p>
             <a:fld id="{6AD31072-9D89-4BEC-8866-A84FEAA74BA9}" type="datetimeFigureOut">
               <a:rPr lang="en-US" smtClean="0"/>
-              <a:t>11/20/2024</a:t>
+              <a:t>12/13/2024</a:t>
             </a:fld>
             <a:endParaRPr lang="en-US"/>
           </a:p>
@@ -1390,7 +1475,7 @@
           <a:p>
             <a:fld id="{6AD31072-9D89-4BEC-8866-A84FEAA74BA9}" type="datetimeFigureOut">
               <a:rPr lang="en-US" smtClean="0"/>
-              <a:t>11/20/2024</a:t>
+              <a:t>12/13/2024</a:t>
             </a:fld>
             <a:endParaRPr lang="en-US"/>
           </a:p>
@@ -1665,7 +1750,7 @@
           <a:p>
             <a:fld id="{6AD31072-9D89-4BEC-8866-A84FEAA74BA9}" type="datetimeFigureOut">
               <a:rPr lang="en-US" smtClean="0"/>
-              <a:t>11/20/2024</a:t>
+              <a:t>12/13/2024</a:t>
             </a:fld>
             <a:endParaRPr lang="en-US"/>
           </a:p>
@@ -1930,7 +2015,7 @@
           <a:p>
             <a:fld id="{6AD31072-9D89-4BEC-8866-A84FEAA74BA9}" type="datetimeFigureOut">
               <a:rPr lang="en-US" smtClean="0"/>
-              <a:t>11/20/2024</a:t>
+              <a:t>12/13/2024</a:t>
             </a:fld>
             <a:endParaRPr lang="en-US"/>
           </a:p>
@@ -2342,7 +2427,7 @@
           <a:p>
             <a:fld id="{6AD31072-9D89-4BEC-8866-A84FEAA74BA9}" type="datetimeFigureOut">
               <a:rPr lang="en-US" smtClean="0"/>
-              <a:t>11/20/2024</a:t>
+              <a:t>12/13/2024</a:t>
             </a:fld>
             <a:endParaRPr lang="en-US"/>
           </a:p>
@@ -2483,7 +2568,7 @@
           <a:p>
             <a:fld id="{6AD31072-9D89-4BEC-8866-A84FEAA74BA9}" type="datetimeFigureOut">
               <a:rPr lang="en-US" smtClean="0"/>
-              <a:t>11/20/2024</a:t>
+              <a:t>12/13/2024</a:t>
             </a:fld>
             <a:endParaRPr lang="en-US"/>
           </a:p>
@@ -2596,7 +2681,7 @@
           <a:p>
             <a:fld id="{6AD31072-9D89-4BEC-8866-A84FEAA74BA9}" type="datetimeFigureOut">
               <a:rPr lang="en-US" smtClean="0"/>
-              <a:t>11/20/2024</a:t>
+              <a:t>12/13/2024</a:t>
             </a:fld>
             <a:endParaRPr lang="en-US"/>
           </a:p>
@@ -2907,7 +2992,7 @@
           <a:p>
             <a:fld id="{6AD31072-9D89-4BEC-8866-A84FEAA74BA9}" type="datetimeFigureOut">
               <a:rPr lang="en-US" smtClean="0"/>
-              <a:t>11/20/2024</a:t>
+              <a:t>12/13/2024</a:t>
             </a:fld>
             <a:endParaRPr lang="en-US"/>
           </a:p>
@@ -3195,7 +3280,7 @@
           <a:p>
             <a:fld id="{6AD31072-9D89-4BEC-8866-A84FEAA74BA9}" type="datetimeFigureOut">
               <a:rPr lang="en-US" smtClean="0"/>
-              <a:t>11/20/2024</a:t>
+              <a:t>12/13/2024</a:t>
             </a:fld>
             <a:endParaRPr lang="en-US"/>
           </a:p>
@@ -3436,7 +3521,7 @@
           <a:p>
             <a:fld id="{6AD31072-9D89-4BEC-8866-A84FEAA74BA9}" type="datetimeFigureOut">
               <a:rPr lang="en-US" smtClean="0"/>
-              <a:t>11/20/2024</a:t>
+              <a:t>12/13/2024</a:t>
             </a:fld>
             <a:endParaRPr lang="en-US"/>
           </a:p>
@@ -10298,6 +10383,1290 @@
 </p:sld>
 </file>
 
+<file path=ppt/slides/slide6.xml><?xml version="1.0" encoding="utf-8"?>
+<p:sld xmlns:a="http://schemas.openxmlformats.org/drawingml/2006/main" xmlns:r="http://schemas.openxmlformats.org/officeDocument/2006/relationships" xmlns:p="http://schemas.openxmlformats.org/presentationml/2006/main">
+  <p:cSld>
+    <p:spTree>
+      <p:nvGrpSpPr>
+        <p:cNvPr id="1" name=""/>
+        <p:cNvGrpSpPr/>
+        <p:nvPr/>
+      </p:nvGrpSpPr>
+      <p:grpSpPr>
+        <a:xfrm>
+          <a:off x="0" y="0"/>
+          <a:ext cx="0" cy="0"/>
+          <a:chOff x="0" y="0"/>
+          <a:chExt cx="0" cy="0"/>
+        </a:xfrm>
+      </p:grpSpPr>
+      <p:sp>
+        <p:nvSpPr>
+          <p:cNvPr id="4" name="Rectangle 3">
+            <a:extLst>
+              <a:ext uri="{FF2B5EF4-FFF2-40B4-BE49-F238E27FC236}">
+                <a16:creationId xmlns:a16="http://schemas.microsoft.com/office/drawing/2014/main" id="{5B92EF8E-ED96-48A8-81B1-24841136C312}"/>
+              </a:ext>
+            </a:extLst>
+          </p:cNvPr>
+          <p:cNvSpPr/>
+          <p:nvPr/>
+        </p:nvSpPr>
+        <p:spPr>
+          <a:xfrm>
+            <a:off x="708660" y="1776173"/>
+            <a:ext cx="7885675" cy="2176371"/>
+          </a:xfrm>
+          <a:prstGeom prst="rect">
+            <a:avLst/>
+          </a:prstGeom>
+          <a:solidFill>
+            <a:schemeClr val="bg1">
+              <a:lumMod val="65000"/>
+            </a:schemeClr>
+          </a:solidFill>
+          <a:ln>
+            <a:solidFill>
+              <a:schemeClr val="bg1">
+                <a:lumMod val="75000"/>
+              </a:schemeClr>
+            </a:solidFill>
+          </a:ln>
+        </p:spPr>
+        <p:style>
+          <a:lnRef idx="2">
+            <a:schemeClr val="accent1">
+              <a:shade val="50000"/>
+            </a:schemeClr>
+          </a:lnRef>
+          <a:fillRef idx="1">
+            <a:schemeClr val="accent1"/>
+          </a:fillRef>
+          <a:effectRef idx="0">
+            <a:schemeClr val="accent1"/>
+          </a:effectRef>
+          <a:fontRef idx="minor">
+            <a:schemeClr val="lt1"/>
+          </a:fontRef>
+        </p:style>
+        <p:txBody>
+          <a:bodyPr rtlCol="0" anchor="ctr"/>
+          <a:lstStyle/>
+          <a:p>
+            <a:pPr algn="ctr"/>
+            <a:endParaRPr lang="en-US" dirty="0"/>
+          </a:p>
+        </p:txBody>
+      </p:sp>
+      <p:sp>
+        <p:nvSpPr>
+          <p:cNvPr id="6" name="Oval 5">
+            <a:extLst>
+              <a:ext uri="{FF2B5EF4-FFF2-40B4-BE49-F238E27FC236}">
+                <a16:creationId xmlns:a16="http://schemas.microsoft.com/office/drawing/2014/main" id="{EB835081-81E2-4ABD-833E-218506ECCFDE}"/>
+              </a:ext>
+            </a:extLst>
+          </p:cNvPr>
+          <p:cNvSpPr/>
+          <p:nvPr/>
+        </p:nvSpPr>
+        <p:spPr>
+          <a:xfrm>
+            <a:off x="959158" y="1961374"/>
+            <a:ext cx="1676299" cy="1695545"/>
+          </a:xfrm>
+          <a:prstGeom prst="ellipse">
+            <a:avLst/>
+          </a:prstGeom>
+          <a:solidFill>
+            <a:schemeClr val="tx1"/>
+          </a:solidFill>
+          <a:ln>
+            <a:solidFill>
+              <a:schemeClr val="tx1"/>
+            </a:solidFill>
+          </a:ln>
+        </p:spPr>
+        <p:style>
+          <a:lnRef idx="2">
+            <a:schemeClr val="accent1">
+              <a:shade val="50000"/>
+            </a:schemeClr>
+          </a:lnRef>
+          <a:fillRef idx="1">
+            <a:schemeClr val="accent1"/>
+          </a:fillRef>
+          <a:effectRef idx="0">
+            <a:schemeClr val="accent1"/>
+          </a:effectRef>
+          <a:fontRef idx="minor">
+            <a:schemeClr val="lt1"/>
+          </a:fontRef>
+        </p:style>
+        <p:txBody>
+          <a:bodyPr rtlCol="0" anchor="ctr"/>
+          <a:lstStyle/>
+          <a:p>
+            <a:pPr algn="ctr"/>
+            <a:endParaRPr lang="en-US"/>
+          </a:p>
+        </p:txBody>
+      </p:sp>
+      <p:cxnSp>
+        <p:nvCxnSpPr>
+          <p:cNvPr id="7" name="Straight Arrow Connector 6">
+            <a:extLst>
+              <a:ext uri="{FF2B5EF4-FFF2-40B4-BE49-F238E27FC236}">
+                <a16:creationId xmlns:a16="http://schemas.microsoft.com/office/drawing/2014/main" id="{44C6D0E6-B619-4CD1-B568-EA928C165AAD}"/>
+              </a:ext>
+            </a:extLst>
+          </p:cNvPr>
+          <p:cNvCxnSpPr>
+            <a:cxnSpLocks/>
+          </p:cNvCxnSpPr>
+          <p:nvPr/>
+        </p:nvCxnSpPr>
+        <p:spPr>
+          <a:xfrm>
+            <a:off x="708660" y="4446270"/>
+            <a:ext cx="10458450" cy="0"/>
+          </a:xfrm>
+          <a:prstGeom prst="straightConnector1">
+            <a:avLst/>
+          </a:prstGeom>
+          <a:ln w="76200">
+            <a:solidFill>
+              <a:srgbClr val="92D050"/>
+            </a:solidFill>
+            <a:tailEnd type="triangle"/>
+          </a:ln>
+        </p:spPr>
+        <p:style>
+          <a:lnRef idx="1">
+            <a:schemeClr val="accent1"/>
+          </a:lnRef>
+          <a:fillRef idx="0">
+            <a:schemeClr val="accent1"/>
+          </a:fillRef>
+          <a:effectRef idx="0">
+            <a:schemeClr val="accent1"/>
+          </a:effectRef>
+          <a:fontRef idx="minor">
+            <a:schemeClr val="tx1"/>
+          </a:fontRef>
+        </p:style>
+      </p:cxnSp>
+      <p:sp>
+        <p:nvSpPr>
+          <p:cNvPr id="8" name="TextBox 7">
+            <a:extLst>
+              <a:ext uri="{FF2B5EF4-FFF2-40B4-BE49-F238E27FC236}">
+                <a16:creationId xmlns:a16="http://schemas.microsoft.com/office/drawing/2014/main" id="{C0D75C47-85EE-4197-9B38-8BBE84347C76}"/>
+              </a:ext>
+            </a:extLst>
+          </p:cNvPr>
+          <p:cNvSpPr txBox="1"/>
+          <p:nvPr/>
+        </p:nvSpPr>
+        <p:spPr>
+          <a:xfrm>
+            <a:off x="5143500" y="4805273"/>
+            <a:ext cx="2366010" cy="707886"/>
+          </a:xfrm>
+          <a:prstGeom prst="rect">
+            <a:avLst/>
+          </a:prstGeom>
+          <a:noFill/>
+        </p:spPr>
+        <p:txBody>
+          <a:bodyPr wrap="square" rtlCol="0">
+            <a:spAutoFit/>
+          </a:bodyPr>
+          <a:lstStyle/>
+          <a:p>
+            <a:r>
+              <a:rPr lang="en-US" sz="4000" dirty="0"/>
+              <a:t>Time</a:t>
+            </a:r>
+          </a:p>
+        </p:txBody>
+      </p:sp>
+      <p:grpSp>
+        <p:nvGrpSpPr>
+          <p:cNvPr id="17" name="Group 16">
+            <a:extLst>
+              <a:ext uri="{FF2B5EF4-FFF2-40B4-BE49-F238E27FC236}">
+                <a16:creationId xmlns:a16="http://schemas.microsoft.com/office/drawing/2014/main" id="{FFBA70C9-F5C5-4C2D-B0D3-92CCE954E1BA}"/>
+              </a:ext>
+            </a:extLst>
+          </p:cNvPr>
+          <p:cNvGrpSpPr/>
+          <p:nvPr/>
+        </p:nvGrpSpPr>
+        <p:grpSpPr>
+          <a:xfrm>
+            <a:off x="6517778" y="1831116"/>
+            <a:ext cx="1155730" cy="2066483"/>
+            <a:chOff x="8066003" y="1786772"/>
+            <a:chExt cx="1155730" cy="2066483"/>
+          </a:xfrm>
+          <a:solidFill>
+            <a:srgbClr val="000000">
+              <a:alpha val="23922"/>
+            </a:srgbClr>
+          </a:solidFill>
+        </p:grpSpPr>
+        <p:sp>
+          <p:nvSpPr>
+            <p:cNvPr id="10" name="Rectangle 9">
+              <a:extLst>
+                <a:ext uri="{FF2B5EF4-FFF2-40B4-BE49-F238E27FC236}">
+                  <a16:creationId xmlns:a16="http://schemas.microsoft.com/office/drawing/2014/main" id="{47DD9728-3C5D-46C4-9930-F0556CDC1D5B}"/>
+                </a:ext>
+              </a:extLst>
+            </p:cNvPr>
+            <p:cNvSpPr/>
+            <p:nvPr/>
+          </p:nvSpPr>
+          <p:spPr>
+            <a:xfrm rot="19340215">
+              <a:off x="8209067" y="2321573"/>
+              <a:ext cx="171115" cy="1531682"/>
+            </a:xfrm>
+            <a:prstGeom prst="rect">
+              <a:avLst/>
+            </a:prstGeom>
+            <a:solidFill>
+              <a:schemeClr val="bg1"/>
+            </a:solidFill>
+            <a:ln w="3175">
+              <a:solidFill>
+                <a:schemeClr val="tx1"/>
+              </a:solidFill>
+            </a:ln>
+            <a:effectLst>
+              <a:softEdge rad="63500"/>
+            </a:effectLst>
+          </p:spPr>
+          <p:style>
+            <a:lnRef idx="2">
+              <a:schemeClr val="accent1">
+                <a:shade val="50000"/>
+              </a:schemeClr>
+            </a:lnRef>
+            <a:fillRef idx="1">
+              <a:schemeClr val="accent1"/>
+            </a:fillRef>
+            <a:effectRef idx="0">
+              <a:schemeClr val="accent1"/>
+            </a:effectRef>
+            <a:fontRef idx="minor">
+              <a:schemeClr val="lt1"/>
+            </a:fontRef>
+          </p:style>
+          <p:txBody>
+            <a:bodyPr rtlCol="0" anchor="ctr"/>
+            <a:lstStyle/>
+            <a:p>
+              <a:pPr algn="ctr"/>
+              <a:endParaRPr lang="en-US"/>
+            </a:p>
+          </p:txBody>
+        </p:sp>
+        <p:sp>
+          <p:nvSpPr>
+            <p:cNvPr id="11" name="Rectangle 10">
+              <a:extLst>
+                <a:ext uri="{FF2B5EF4-FFF2-40B4-BE49-F238E27FC236}">
+                  <a16:creationId xmlns:a16="http://schemas.microsoft.com/office/drawing/2014/main" id="{41BA987E-F94B-49B9-87C6-390111FFBAD6}"/>
+                </a:ext>
+              </a:extLst>
+            </p:cNvPr>
+            <p:cNvSpPr/>
+            <p:nvPr/>
+          </p:nvSpPr>
+          <p:spPr>
+            <a:xfrm rot="19340215">
+              <a:off x="8375666" y="2082857"/>
+              <a:ext cx="171115" cy="1731925"/>
+            </a:xfrm>
+            <a:prstGeom prst="rect">
+              <a:avLst/>
+            </a:prstGeom>
+            <a:solidFill>
+              <a:schemeClr val="bg1"/>
+            </a:solidFill>
+            <a:ln w="3175">
+              <a:solidFill>
+                <a:schemeClr val="tx1"/>
+              </a:solidFill>
+            </a:ln>
+            <a:effectLst>
+              <a:softEdge rad="63500"/>
+            </a:effectLst>
+          </p:spPr>
+          <p:style>
+            <a:lnRef idx="2">
+              <a:schemeClr val="accent1">
+                <a:shade val="50000"/>
+              </a:schemeClr>
+            </a:lnRef>
+            <a:fillRef idx="1">
+              <a:schemeClr val="accent1"/>
+            </a:fillRef>
+            <a:effectRef idx="0">
+              <a:schemeClr val="accent1"/>
+            </a:effectRef>
+            <a:fontRef idx="minor">
+              <a:schemeClr val="lt1"/>
+            </a:fontRef>
+          </p:style>
+          <p:txBody>
+            <a:bodyPr rtlCol="0" anchor="ctr"/>
+            <a:lstStyle/>
+            <a:p>
+              <a:pPr algn="ctr"/>
+              <a:endParaRPr lang="en-US"/>
+            </a:p>
+          </p:txBody>
+        </p:sp>
+        <p:sp>
+          <p:nvSpPr>
+            <p:cNvPr id="12" name="Rectangle 11">
+              <a:extLst>
+                <a:ext uri="{FF2B5EF4-FFF2-40B4-BE49-F238E27FC236}">
+                  <a16:creationId xmlns:a16="http://schemas.microsoft.com/office/drawing/2014/main" id="{F56BAE5F-3B4F-4683-8A96-7AC5F07A0D99}"/>
+                </a:ext>
+              </a:extLst>
+            </p:cNvPr>
+            <p:cNvSpPr/>
+            <p:nvPr/>
+          </p:nvSpPr>
+          <p:spPr>
+            <a:xfrm rot="19340215">
+              <a:off x="8544197" y="1934767"/>
+              <a:ext cx="171115" cy="1814694"/>
+            </a:xfrm>
+            <a:prstGeom prst="rect">
+              <a:avLst/>
+            </a:prstGeom>
+            <a:solidFill>
+              <a:schemeClr val="bg1"/>
+            </a:solidFill>
+            <a:ln w="3175">
+              <a:solidFill>
+                <a:schemeClr val="tx1"/>
+              </a:solidFill>
+            </a:ln>
+            <a:effectLst>
+              <a:softEdge rad="63500"/>
+            </a:effectLst>
+          </p:spPr>
+          <p:style>
+            <a:lnRef idx="2">
+              <a:schemeClr val="accent1">
+                <a:shade val="50000"/>
+              </a:schemeClr>
+            </a:lnRef>
+            <a:fillRef idx="1">
+              <a:schemeClr val="accent1"/>
+            </a:fillRef>
+            <a:effectRef idx="0">
+              <a:schemeClr val="accent1"/>
+            </a:effectRef>
+            <a:fontRef idx="minor">
+              <a:schemeClr val="lt1"/>
+            </a:fontRef>
+          </p:style>
+          <p:txBody>
+            <a:bodyPr rtlCol="0" anchor="ctr"/>
+            <a:lstStyle/>
+            <a:p>
+              <a:pPr algn="ctr"/>
+              <a:endParaRPr lang="en-US"/>
+            </a:p>
+          </p:txBody>
+        </p:sp>
+        <p:sp>
+          <p:nvSpPr>
+            <p:cNvPr id="13" name="Rectangle 12">
+              <a:extLst>
+                <a:ext uri="{FF2B5EF4-FFF2-40B4-BE49-F238E27FC236}">
+                  <a16:creationId xmlns:a16="http://schemas.microsoft.com/office/drawing/2014/main" id="{FCEB1945-F3A4-4C2F-9343-C02ABD63A280}"/>
+                </a:ext>
+              </a:extLst>
+            </p:cNvPr>
+            <p:cNvSpPr/>
+            <p:nvPr/>
+          </p:nvSpPr>
+          <p:spPr>
+            <a:xfrm rot="19340215">
+              <a:off x="8066003" y="2640369"/>
+              <a:ext cx="171115" cy="1195415"/>
+            </a:xfrm>
+            <a:prstGeom prst="rect">
+              <a:avLst/>
+            </a:prstGeom>
+            <a:solidFill>
+              <a:schemeClr val="bg1"/>
+            </a:solidFill>
+            <a:ln w="3175">
+              <a:solidFill>
+                <a:schemeClr val="tx1"/>
+              </a:solidFill>
+            </a:ln>
+            <a:effectLst>
+              <a:softEdge rad="63500"/>
+            </a:effectLst>
+          </p:spPr>
+          <p:style>
+            <a:lnRef idx="2">
+              <a:schemeClr val="accent1">
+                <a:shade val="50000"/>
+              </a:schemeClr>
+            </a:lnRef>
+            <a:fillRef idx="1">
+              <a:schemeClr val="accent1"/>
+            </a:fillRef>
+            <a:effectRef idx="0">
+              <a:schemeClr val="accent1"/>
+            </a:effectRef>
+            <a:fontRef idx="minor">
+              <a:schemeClr val="lt1"/>
+            </a:fontRef>
+          </p:style>
+          <p:txBody>
+            <a:bodyPr rtlCol="0" anchor="ctr"/>
+            <a:lstStyle/>
+            <a:p>
+              <a:pPr algn="ctr"/>
+              <a:endParaRPr lang="en-US"/>
+            </a:p>
+          </p:txBody>
+        </p:sp>
+        <p:sp>
+          <p:nvSpPr>
+            <p:cNvPr id="14" name="Rectangle 13">
+              <a:extLst>
+                <a:ext uri="{FF2B5EF4-FFF2-40B4-BE49-F238E27FC236}">
+                  <a16:creationId xmlns:a16="http://schemas.microsoft.com/office/drawing/2014/main" id="{5DECDC5B-D580-431B-86D4-3D67A95CD808}"/>
+                </a:ext>
+              </a:extLst>
+            </p:cNvPr>
+            <p:cNvSpPr/>
+            <p:nvPr/>
+          </p:nvSpPr>
+          <p:spPr>
+            <a:xfrm rot="19340215">
+              <a:off x="9050618" y="1852722"/>
+              <a:ext cx="171115" cy="1158038"/>
+            </a:xfrm>
+            <a:prstGeom prst="rect">
+              <a:avLst/>
+            </a:prstGeom>
+            <a:solidFill>
+              <a:schemeClr val="bg1"/>
+            </a:solidFill>
+            <a:ln w="3175">
+              <a:solidFill>
+                <a:schemeClr val="tx1"/>
+              </a:solidFill>
+            </a:ln>
+            <a:effectLst>
+              <a:softEdge rad="63500"/>
+            </a:effectLst>
+          </p:spPr>
+          <p:style>
+            <a:lnRef idx="2">
+              <a:schemeClr val="accent1">
+                <a:shade val="50000"/>
+              </a:schemeClr>
+            </a:lnRef>
+            <a:fillRef idx="1">
+              <a:schemeClr val="accent1"/>
+            </a:fillRef>
+            <a:effectRef idx="0">
+              <a:schemeClr val="accent1"/>
+            </a:effectRef>
+            <a:fontRef idx="minor">
+              <a:schemeClr val="lt1"/>
+            </a:fontRef>
+          </p:style>
+          <p:txBody>
+            <a:bodyPr rtlCol="0" anchor="ctr"/>
+            <a:lstStyle/>
+            <a:p>
+              <a:pPr algn="ctr"/>
+              <a:endParaRPr lang="en-US"/>
+            </a:p>
+          </p:txBody>
+        </p:sp>
+        <p:sp>
+          <p:nvSpPr>
+            <p:cNvPr id="15" name="Rectangle 14">
+              <a:extLst>
+                <a:ext uri="{FF2B5EF4-FFF2-40B4-BE49-F238E27FC236}">
+                  <a16:creationId xmlns:a16="http://schemas.microsoft.com/office/drawing/2014/main" id="{5523A8CC-1C7E-4063-A7C6-35707A7A060B}"/>
+                </a:ext>
+              </a:extLst>
+            </p:cNvPr>
+            <p:cNvSpPr/>
+            <p:nvPr/>
+          </p:nvSpPr>
+          <p:spPr>
+            <a:xfrm rot="19340215">
+              <a:off x="8893128" y="1786772"/>
+              <a:ext cx="171115" cy="1568850"/>
+            </a:xfrm>
+            <a:prstGeom prst="rect">
+              <a:avLst/>
+            </a:prstGeom>
+            <a:solidFill>
+              <a:schemeClr val="bg1"/>
+            </a:solidFill>
+            <a:ln w="3175">
+              <a:solidFill>
+                <a:schemeClr val="tx1"/>
+              </a:solidFill>
+            </a:ln>
+            <a:effectLst>
+              <a:softEdge rad="63500"/>
+            </a:effectLst>
+          </p:spPr>
+          <p:style>
+            <a:lnRef idx="2">
+              <a:schemeClr val="accent1">
+                <a:shade val="50000"/>
+              </a:schemeClr>
+            </a:lnRef>
+            <a:fillRef idx="1">
+              <a:schemeClr val="accent1"/>
+            </a:fillRef>
+            <a:effectRef idx="0">
+              <a:schemeClr val="accent1"/>
+            </a:effectRef>
+            <a:fontRef idx="minor">
+              <a:schemeClr val="lt1"/>
+            </a:fontRef>
+          </p:style>
+          <p:txBody>
+            <a:bodyPr rtlCol="0" anchor="ctr"/>
+            <a:lstStyle/>
+            <a:p>
+              <a:pPr algn="ctr"/>
+              <a:endParaRPr lang="en-US"/>
+            </a:p>
+          </p:txBody>
+        </p:sp>
+        <p:sp>
+          <p:nvSpPr>
+            <p:cNvPr id="16" name="Rectangle 15">
+              <a:extLst>
+                <a:ext uri="{FF2B5EF4-FFF2-40B4-BE49-F238E27FC236}">
+                  <a16:creationId xmlns:a16="http://schemas.microsoft.com/office/drawing/2014/main" id="{7AEF8F98-16E6-4E0B-BFA6-F15D96E40D10}"/>
+                </a:ext>
+              </a:extLst>
+            </p:cNvPr>
+            <p:cNvSpPr/>
+            <p:nvPr/>
+          </p:nvSpPr>
+          <p:spPr>
+            <a:xfrm rot="19340215">
+              <a:off x="8702828" y="1840715"/>
+              <a:ext cx="171115" cy="1714659"/>
+            </a:xfrm>
+            <a:prstGeom prst="rect">
+              <a:avLst/>
+            </a:prstGeom>
+            <a:solidFill>
+              <a:schemeClr val="bg1"/>
+            </a:solidFill>
+            <a:ln w="3175">
+              <a:solidFill>
+                <a:schemeClr val="tx1"/>
+              </a:solidFill>
+            </a:ln>
+            <a:effectLst>
+              <a:softEdge rad="63500"/>
+            </a:effectLst>
+          </p:spPr>
+          <p:style>
+            <a:lnRef idx="2">
+              <a:schemeClr val="accent1">
+                <a:shade val="50000"/>
+              </a:schemeClr>
+            </a:lnRef>
+            <a:fillRef idx="1">
+              <a:schemeClr val="accent1"/>
+            </a:fillRef>
+            <a:effectRef idx="0">
+              <a:schemeClr val="accent1"/>
+            </a:effectRef>
+            <a:fontRef idx="minor">
+              <a:schemeClr val="lt1"/>
+            </a:fontRef>
+          </p:style>
+          <p:txBody>
+            <a:bodyPr rtlCol="0" anchor="ctr"/>
+            <a:lstStyle/>
+            <a:p>
+              <a:pPr algn="ctr"/>
+              <a:endParaRPr lang="en-US"/>
+            </a:p>
+          </p:txBody>
+        </p:sp>
+      </p:grpSp>
+      <p:sp>
+        <p:nvSpPr>
+          <p:cNvPr id="27" name="Rectangle 26">
+            <a:extLst>
+              <a:ext uri="{FF2B5EF4-FFF2-40B4-BE49-F238E27FC236}">
+                <a16:creationId xmlns:a16="http://schemas.microsoft.com/office/drawing/2014/main" id="{F20472CC-5A30-4623-A765-B3ECEAAA1388}"/>
+              </a:ext>
+            </a:extLst>
+          </p:cNvPr>
+          <p:cNvSpPr/>
+          <p:nvPr/>
+        </p:nvSpPr>
+        <p:spPr>
+          <a:xfrm rot="19340215">
+            <a:off x="6368150" y="3116961"/>
+            <a:ext cx="177230" cy="565407"/>
+          </a:xfrm>
+          <a:prstGeom prst="rect">
+            <a:avLst/>
+          </a:prstGeom>
+          <a:solidFill>
+            <a:schemeClr val="bg1"/>
+          </a:solidFill>
+          <a:ln w="3175">
+            <a:solidFill>
+              <a:schemeClr val="tx1"/>
+            </a:solidFill>
+          </a:ln>
+          <a:effectLst>
+            <a:softEdge rad="63500"/>
+          </a:effectLst>
+        </p:spPr>
+        <p:style>
+          <a:lnRef idx="2">
+            <a:schemeClr val="accent1">
+              <a:shade val="50000"/>
+            </a:schemeClr>
+          </a:lnRef>
+          <a:fillRef idx="1">
+            <a:schemeClr val="accent1"/>
+          </a:fillRef>
+          <a:effectRef idx="0">
+            <a:schemeClr val="accent1"/>
+          </a:effectRef>
+          <a:fontRef idx="minor">
+            <a:schemeClr val="lt1"/>
+          </a:fontRef>
+        </p:style>
+        <p:txBody>
+          <a:bodyPr rtlCol="0" anchor="ctr"/>
+          <a:lstStyle/>
+          <a:p>
+            <a:pPr algn="ctr"/>
+            <a:endParaRPr lang="en-US"/>
+          </a:p>
+        </p:txBody>
+      </p:sp>
+      <p:sp>
+        <p:nvSpPr>
+          <p:cNvPr id="28" name="Rectangle 27">
+            <a:extLst>
+              <a:ext uri="{FF2B5EF4-FFF2-40B4-BE49-F238E27FC236}">
+                <a16:creationId xmlns:a16="http://schemas.microsoft.com/office/drawing/2014/main" id="{BCF54FF4-3FC3-4061-8FFE-ABA5756378B3}"/>
+              </a:ext>
+            </a:extLst>
+          </p:cNvPr>
+          <p:cNvSpPr/>
+          <p:nvPr/>
+        </p:nvSpPr>
+        <p:spPr>
+          <a:xfrm rot="19340215">
+            <a:off x="7643634" y="2109371"/>
+            <a:ext cx="177230" cy="513446"/>
+          </a:xfrm>
+          <a:prstGeom prst="rect">
+            <a:avLst/>
+          </a:prstGeom>
+          <a:solidFill>
+            <a:schemeClr val="bg1"/>
+          </a:solidFill>
+          <a:ln w="3175">
+            <a:solidFill>
+              <a:schemeClr val="tx1"/>
+            </a:solidFill>
+          </a:ln>
+          <a:effectLst>
+            <a:softEdge rad="63500"/>
+          </a:effectLst>
+        </p:spPr>
+        <p:style>
+          <a:lnRef idx="2">
+            <a:schemeClr val="accent1">
+              <a:shade val="50000"/>
+            </a:schemeClr>
+          </a:lnRef>
+          <a:fillRef idx="1">
+            <a:schemeClr val="accent1"/>
+          </a:fillRef>
+          <a:effectRef idx="0">
+            <a:schemeClr val="accent1"/>
+          </a:effectRef>
+          <a:fontRef idx="minor">
+            <a:schemeClr val="lt1"/>
+          </a:fontRef>
+        </p:style>
+        <p:txBody>
+          <a:bodyPr rtlCol="0" anchor="ctr"/>
+          <a:lstStyle/>
+          <a:p>
+            <a:pPr algn="ctr"/>
+            <a:endParaRPr lang="en-US"/>
+          </a:p>
+        </p:txBody>
+      </p:sp>
+      <p:grpSp>
+        <p:nvGrpSpPr>
+          <p:cNvPr id="39" name="Group 38">
+            <a:extLst>
+              <a:ext uri="{FF2B5EF4-FFF2-40B4-BE49-F238E27FC236}">
+                <a16:creationId xmlns:a16="http://schemas.microsoft.com/office/drawing/2014/main" id="{E8B25E34-CA9C-4F92-A518-97AB7C6328AE}"/>
+              </a:ext>
+            </a:extLst>
+          </p:cNvPr>
+          <p:cNvGrpSpPr/>
+          <p:nvPr/>
+        </p:nvGrpSpPr>
+        <p:grpSpPr>
+          <a:xfrm>
+            <a:off x="6427065" y="1897875"/>
+            <a:ext cx="1321576" cy="2066483"/>
+            <a:chOff x="7971140" y="1860490"/>
+            <a:chExt cx="1321576" cy="2066483"/>
+          </a:xfrm>
+          <a:solidFill>
+            <a:srgbClr val="000000">
+              <a:alpha val="36863"/>
+            </a:srgbClr>
+          </a:solidFill>
+        </p:grpSpPr>
+        <p:grpSp>
+          <p:nvGrpSpPr>
+            <p:cNvPr id="26" name="Group 25">
+              <a:extLst>
+                <a:ext uri="{FF2B5EF4-FFF2-40B4-BE49-F238E27FC236}">
+                  <a16:creationId xmlns:a16="http://schemas.microsoft.com/office/drawing/2014/main" id="{ACF90BC1-EAD6-4D14-ABCA-A32C3954B073}"/>
+                </a:ext>
+              </a:extLst>
+            </p:cNvPr>
+            <p:cNvGrpSpPr/>
+            <p:nvPr/>
+          </p:nvGrpSpPr>
+          <p:grpSpPr>
+            <a:xfrm>
+              <a:off x="7971140" y="1860490"/>
+              <a:ext cx="1190803" cy="2066483"/>
+              <a:chOff x="7966748" y="1867803"/>
+              <a:chExt cx="1190803" cy="2066483"/>
+            </a:xfrm>
+            <a:grpFill/>
+          </p:grpSpPr>
+          <p:sp>
+            <p:nvSpPr>
+              <p:cNvPr id="18" name="Rectangle 17">
+                <a:extLst>
+                  <a:ext uri="{FF2B5EF4-FFF2-40B4-BE49-F238E27FC236}">
+                    <a16:creationId xmlns:a16="http://schemas.microsoft.com/office/drawing/2014/main" id="{FE584FC3-886B-49AA-9AA4-3BEAB9CE11A2}"/>
+                  </a:ext>
+                </a:extLst>
+              </p:cNvPr>
+              <p:cNvSpPr/>
+              <p:nvPr/>
+            </p:nvSpPr>
+            <p:spPr>
+              <a:xfrm rot="19340215">
+                <a:off x="8122927" y="2402604"/>
+                <a:ext cx="171115" cy="1531682"/>
+              </a:xfrm>
+              <a:prstGeom prst="rect">
+                <a:avLst/>
+              </a:prstGeom>
+              <a:grpFill/>
+              <a:ln w="3175">
+                <a:solidFill>
+                  <a:schemeClr val="tx1"/>
+                </a:solidFill>
+              </a:ln>
+              <a:effectLst>
+                <a:softEdge rad="63500"/>
+              </a:effectLst>
+            </p:spPr>
+            <p:style>
+              <a:lnRef idx="2">
+                <a:schemeClr val="accent1">
+                  <a:shade val="50000"/>
+                </a:schemeClr>
+              </a:lnRef>
+              <a:fillRef idx="1">
+                <a:schemeClr val="accent1"/>
+              </a:fillRef>
+              <a:effectRef idx="0">
+                <a:schemeClr val="accent1"/>
+              </a:effectRef>
+              <a:fontRef idx="minor">
+                <a:schemeClr val="lt1"/>
+              </a:fontRef>
+            </p:style>
+            <p:txBody>
+              <a:bodyPr rtlCol="0" anchor="ctr"/>
+              <a:lstStyle/>
+              <a:p>
+                <a:pPr algn="ctr"/>
+                <a:endParaRPr lang="en-US"/>
+              </a:p>
+            </p:txBody>
+          </p:sp>
+          <p:sp>
+            <p:nvSpPr>
+              <p:cNvPr id="19" name="Rectangle 18">
+                <a:extLst>
+                  <a:ext uri="{FF2B5EF4-FFF2-40B4-BE49-F238E27FC236}">
+                    <a16:creationId xmlns:a16="http://schemas.microsoft.com/office/drawing/2014/main" id="{152B7EFA-7EB2-4C67-8285-E0F8543B1C51}"/>
+                  </a:ext>
+                </a:extLst>
+              </p:cNvPr>
+              <p:cNvSpPr/>
+              <p:nvPr/>
+            </p:nvSpPr>
+            <p:spPr>
+              <a:xfrm rot="19340215">
+                <a:off x="8289526" y="2163888"/>
+                <a:ext cx="171115" cy="1731925"/>
+              </a:xfrm>
+              <a:prstGeom prst="rect">
+                <a:avLst/>
+              </a:prstGeom>
+              <a:grpFill/>
+              <a:ln w="3175">
+                <a:solidFill>
+                  <a:schemeClr val="tx1"/>
+                </a:solidFill>
+              </a:ln>
+              <a:effectLst>
+                <a:softEdge rad="63500"/>
+              </a:effectLst>
+            </p:spPr>
+            <p:style>
+              <a:lnRef idx="2">
+                <a:schemeClr val="accent1">
+                  <a:shade val="50000"/>
+                </a:schemeClr>
+              </a:lnRef>
+              <a:fillRef idx="1">
+                <a:schemeClr val="accent1"/>
+              </a:fillRef>
+              <a:effectRef idx="0">
+                <a:schemeClr val="accent1"/>
+              </a:effectRef>
+              <a:fontRef idx="minor">
+                <a:schemeClr val="lt1"/>
+              </a:fontRef>
+            </p:style>
+            <p:txBody>
+              <a:bodyPr rtlCol="0" anchor="ctr"/>
+              <a:lstStyle/>
+              <a:p>
+                <a:pPr algn="ctr"/>
+                <a:endParaRPr lang="en-US"/>
+              </a:p>
+            </p:txBody>
+          </p:sp>
+          <p:sp>
+            <p:nvSpPr>
+              <p:cNvPr id="20" name="Rectangle 19">
+                <a:extLst>
+                  <a:ext uri="{FF2B5EF4-FFF2-40B4-BE49-F238E27FC236}">
+                    <a16:creationId xmlns:a16="http://schemas.microsoft.com/office/drawing/2014/main" id="{FB5B9E56-069F-478C-95D1-9F1D8A1FDB45}"/>
+                  </a:ext>
+                </a:extLst>
+              </p:cNvPr>
+              <p:cNvSpPr/>
+              <p:nvPr/>
+            </p:nvSpPr>
+            <p:spPr>
+              <a:xfrm rot="19340215">
+                <a:off x="8458057" y="2015798"/>
+                <a:ext cx="171115" cy="1814694"/>
+              </a:xfrm>
+              <a:prstGeom prst="rect">
+                <a:avLst/>
+              </a:prstGeom>
+              <a:grpFill/>
+              <a:ln w="3175">
+                <a:solidFill>
+                  <a:schemeClr val="tx1"/>
+                </a:solidFill>
+              </a:ln>
+              <a:effectLst>
+                <a:softEdge rad="63500"/>
+              </a:effectLst>
+            </p:spPr>
+            <p:style>
+              <a:lnRef idx="2">
+                <a:schemeClr val="accent1">
+                  <a:shade val="50000"/>
+                </a:schemeClr>
+              </a:lnRef>
+              <a:fillRef idx="1">
+                <a:schemeClr val="accent1"/>
+              </a:fillRef>
+              <a:effectRef idx="0">
+                <a:schemeClr val="accent1"/>
+              </a:effectRef>
+              <a:fontRef idx="minor">
+                <a:schemeClr val="lt1"/>
+              </a:fontRef>
+            </p:style>
+            <p:txBody>
+              <a:bodyPr rtlCol="0" anchor="ctr"/>
+              <a:lstStyle/>
+              <a:p>
+                <a:pPr algn="ctr"/>
+                <a:endParaRPr lang="en-US"/>
+              </a:p>
+            </p:txBody>
+          </p:sp>
+          <p:sp>
+            <p:nvSpPr>
+              <p:cNvPr id="21" name="Rectangle 20">
+                <a:extLst>
+                  <a:ext uri="{FF2B5EF4-FFF2-40B4-BE49-F238E27FC236}">
+                    <a16:creationId xmlns:a16="http://schemas.microsoft.com/office/drawing/2014/main" id="{08BF607D-49F9-4241-A4F5-0AD43C1D6769}"/>
+                  </a:ext>
+                </a:extLst>
+              </p:cNvPr>
+              <p:cNvSpPr/>
+              <p:nvPr/>
+            </p:nvSpPr>
+            <p:spPr>
+              <a:xfrm rot="19340215">
+                <a:off x="7966748" y="2815627"/>
+                <a:ext cx="171115" cy="972978"/>
+              </a:xfrm>
+              <a:prstGeom prst="rect">
+                <a:avLst/>
+              </a:prstGeom>
+              <a:grpFill/>
+              <a:ln w="3175">
+                <a:solidFill>
+                  <a:schemeClr val="tx1"/>
+                </a:solidFill>
+              </a:ln>
+              <a:effectLst>
+                <a:softEdge rad="63500"/>
+              </a:effectLst>
+            </p:spPr>
+            <p:style>
+              <a:lnRef idx="2">
+                <a:schemeClr val="accent1">
+                  <a:shade val="50000"/>
+                </a:schemeClr>
+              </a:lnRef>
+              <a:fillRef idx="1">
+                <a:schemeClr val="accent1"/>
+              </a:fillRef>
+              <a:effectRef idx="0">
+                <a:schemeClr val="accent1"/>
+              </a:effectRef>
+              <a:fontRef idx="minor">
+                <a:schemeClr val="lt1"/>
+              </a:fontRef>
+            </p:style>
+            <p:txBody>
+              <a:bodyPr rtlCol="0" anchor="ctr"/>
+              <a:lstStyle/>
+              <a:p>
+                <a:pPr algn="ctr"/>
+                <a:endParaRPr lang="en-US"/>
+              </a:p>
+            </p:txBody>
+          </p:sp>
+          <p:sp>
+            <p:nvSpPr>
+              <p:cNvPr id="22" name="Rectangle 21">
+                <a:extLst>
+                  <a:ext uri="{FF2B5EF4-FFF2-40B4-BE49-F238E27FC236}">
+                    <a16:creationId xmlns:a16="http://schemas.microsoft.com/office/drawing/2014/main" id="{D9622784-549A-46A5-88C7-9DF023FFE510}"/>
+                  </a:ext>
+                </a:extLst>
+              </p:cNvPr>
+              <p:cNvSpPr/>
+              <p:nvPr/>
+            </p:nvSpPr>
+            <p:spPr>
+              <a:xfrm rot="19340215">
+                <a:off x="8986436" y="1894239"/>
+                <a:ext cx="171115" cy="1293964"/>
+              </a:xfrm>
+              <a:prstGeom prst="rect">
+                <a:avLst/>
+              </a:prstGeom>
+              <a:grpFill/>
+              <a:ln w="3175">
+                <a:solidFill>
+                  <a:schemeClr val="tx1"/>
+                </a:solidFill>
+              </a:ln>
+              <a:effectLst>
+                <a:softEdge rad="63500"/>
+              </a:effectLst>
+            </p:spPr>
+            <p:style>
+              <a:lnRef idx="2">
+                <a:schemeClr val="accent1">
+                  <a:shade val="50000"/>
+                </a:schemeClr>
+              </a:lnRef>
+              <a:fillRef idx="1">
+                <a:schemeClr val="accent1"/>
+              </a:fillRef>
+              <a:effectRef idx="0">
+                <a:schemeClr val="accent1"/>
+              </a:effectRef>
+              <a:fontRef idx="minor">
+                <a:schemeClr val="lt1"/>
+              </a:fontRef>
+            </p:style>
+            <p:txBody>
+              <a:bodyPr rtlCol="0" anchor="ctr"/>
+              <a:lstStyle/>
+              <a:p>
+                <a:pPr algn="ctr"/>
+                <a:endParaRPr lang="en-US"/>
+              </a:p>
+            </p:txBody>
+          </p:sp>
+          <p:sp>
+            <p:nvSpPr>
+              <p:cNvPr id="23" name="Rectangle 22">
+                <a:extLst>
+                  <a:ext uri="{FF2B5EF4-FFF2-40B4-BE49-F238E27FC236}">
+                    <a16:creationId xmlns:a16="http://schemas.microsoft.com/office/drawing/2014/main" id="{83757505-CCB7-4FC2-8A73-DD858AFB6BD1}"/>
+                  </a:ext>
+                </a:extLst>
+              </p:cNvPr>
+              <p:cNvSpPr/>
+              <p:nvPr/>
+            </p:nvSpPr>
+            <p:spPr>
+              <a:xfrm rot="19340215">
+                <a:off x="8806988" y="1867803"/>
+                <a:ext cx="171115" cy="1568850"/>
+              </a:xfrm>
+              <a:prstGeom prst="rect">
+                <a:avLst/>
+              </a:prstGeom>
+              <a:grpFill/>
+              <a:ln w="3175">
+                <a:solidFill>
+                  <a:schemeClr val="tx1"/>
+                </a:solidFill>
+              </a:ln>
+              <a:effectLst>
+                <a:softEdge rad="63500"/>
+              </a:effectLst>
+            </p:spPr>
+            <p:style>
+              <a:lnRef idx="2">
+                <a:schemeClr val="accent1">
+                  <a:shade val="50000"/>
+                </a:schemeClr>
+              </a:lnRef>
+              <a:fillRef idx="1">
+                <a:schemeClr val="accent1"/>
+              </a:fillRef>
+              <a:effectRef idx="0">
+                <a:schemeClr val="accent1"/>
+              </a:effectRef>
+              <a:fontRef idx="minor">
+                <a:schemeClr val="lt1"/>
+              </a:fontRef>
+            </p:style>
+            <p:txBody>
+              <a:bodyPr rtlCol="0" anchor="ctr"/>
+              <a:lstStyle/>
+              <a:p>
+                <a:pPr algn="ctr"/>
+                <a:endParaRPr lang="en-US"/>
+              </a:p>
+            </p:txBody>
+          </p:sp>
+          <p:sp>
+            <p:nvSpPr>
+              <p:cNvPr id="24" name="Rectangle 23">
+                <a:extLst>
+                  <a:ext uri="{FF2B5EF4-FFF2-40B4-BE49-F238E27FC236}">
+                    <a16:creationId xmlns:a16="http://schemas.microsoft.com/office/drawing/2014/main" id="{626A34A4-70DF-4A56-8B0B-5099E00ACEB8}"/>
+                  </a:ext>
+                </a:extLst>
+              </p:cNvPr>
+              <p:cNvSpPr/>
+              <p:nvPr/>
+            </p:nvSpPr>
+            <p:spPr>
+              <a:xfrm rot="19340215">
+                <a:off x="8616688" y="1921746"/>
+                <a:ext cx="171115" cy="1714659"/>
+              </a:xfrm>
+              <a:prstGeom prst="rect">
+                <a:avLst/>
+              </a:prstGeom>
+              <a:grpFill/>
+              <a:ln w="3175">
+                <a:solidFill>
+                  <a:schemeClr val="tx1"/>
+                </a:solidFill>
+              </a:ln>
+              <a:effectLst>
+                <a:softEdge rad="63500"/>
+              </a:effectLst>
+            </p:spPr>
+            <p:style>
+              <a:lnRef idx="2">
+                <a:schemeClr val="accent1">
+                  <a:shade val="50000"/>
+                </a:schemeClr>
+              </a:lnRef>
+              <a:fillRef idx="1">
+                <a:schemeClr val="accent1"/>
+              </a:fillRef>
+              <a:effectRef idx="0">
+                <a:schemeClr val="accent1"/>
+              </a:effectRef>
+              <a:fontRef idx="minor">
+                <a:schemeClr val="lt1"/>
+              </a:fontRef>
+            </p:style>
+            <p:txBody>
+              <a:bodyPr rtlCol="0" anchor="ctr"/>
+              <a:lstStyle/>
+              <a:p>
+                <a:pPr algn="ctr"/>
+                <a:endParaRPr lang="en-US" dirty="0"/>
+              </a:p>
+            </p:txBody>
+          </p:sp>
+        </p:grpSp>
+        <p:sp>
+          <p:nvSpPr>
+            <p:cNvPr id="29" name="Rectangle 28">
+              <a:extLst>
+                <a:ext uri="{FF2B5EF4-FFF2-40B4-BE49-F238E27FC236}">
+                  <a16:creationId xmlns:a16="http://schemas.microsoft.com/office/drawing/2014/main" id="{899CAD03-B494-4B0F-96E8-C14AF20B64E2}"/>
+                </a:ext>
+              </a:extLst>
+            </p:cNvPr>
+            <p:cNvSpPr/>
+            <p:nvPr/>
+          </p:nvSpPr>
+          <p:spPr>
+            <a:xfrm rot="19340215">
+              <a:off x="9121601" y="1924811"/>
+              <a:ext cx="171115" cy="905329"/>
+            </a:xfrm>
+            <a:prstGeom prst="rect">
+              <a:avLst/>
+            </a:prstGeom>
+            <a:grpFill/>
+            <a:ln w="3175">
+              <a:solidFill>
+                <a:schemeClr val="tx1"/>
+              </a:solidFill>
+            </a:ln>
+            <a:effectLst>
+              <a:softEdge rad="63500"/>
+            </a:effectLst>
+          </p:spPr>
+          <p:style>
+            <a:lnRef idx="2">
+              <a:schemeClr val="accent1">
+                <a:shade val="50000"/>
+              </a:schemeClr>
+            </a:lnRef>
+            <a:fillRef idx="1">
+              <a:schemeClr val="accent1"/>
+            </a:fillRef>
+            <a:effectRef idx="0">
+              <a:schemeClr val="accent1"/>
+            </a:effectRef>
+            <a:fontRef idx="minor">
+              <a:schemeClr val="lt1"/>
+            </a:fontRef>
+          </p:style>
+          <p:txBody>
+            <a:bodyPr rtlCol="0" anchor="ctr"/>
+            <a:lstStyle/>
+            <a:p>
+              <a:pPr algn="ctr"/>
+              <a:endParaRPr lang="en-US"/>
+            </a:p>
+          </p:txBody>
+        </p:sp>
+      </p:grpSp>
+      <p:sp>
+        <p:nvSpPr>
+          <p:cNvPr id="50" name="TextBox 49">
+            <a:extLst>
+              <a:ext uri="{FF2B5EF4-FFF2-40B4-BE49-F238E27FC236}">
+                <a16:creationId xmlns:a16="http://schemas.microsoft.com/office/drawing/2014/main" id="{F783F60B-5283-44A4-998C-463D68C0F760}"/>
+              </a:ext>
+            </a:extLst>
+          </p:cNvPr>
+          <p:cNvSpPr txBox="1"/>
+          <p:nvPr/>
+        </p:nvSpPr>
+        <p:spPr>
+          <a:xfrm>
+            <a:off x="9264112" y="2531498"/>
+            <a:ext cx="2110740" cy="461665"/>
+          </a:xfrm>
+          <a:prstGeom prst="rect">
+            <a:avLst/>
+          </a:prstGeom>
+          <a:noFill/>
+        </p:spPr>
+        <p:txBody>
+          <a:bodyPr wrap="square" rtlCol="0">
+            <a:spAutoFit/>
+          </a:bodyPr>
+          <a:lstStyle/>
+          <a:p>
+            <a:pPr algn="ctr"/>
+            <a:r>
+              <a:rPr lang="en-US" sz="2400" dirty="0"/>
+              <a:t>Left or right?</a:t>
+            </a:r>
+          </a:p>
+        </p:txBody>
+      </p:sp>
+    </p:spTree>
+    <p:extLst>
+      <p:ext uri="{BB962C8B-B14F-4D97-AF65-F5344CB8AC3E}">
+        <p14:creationId xmlns:p14="http://schemas.microsoft.com/office/powerpoint/2010/main" val="32447021"/>
+      </p:ext>
+    </p:extLst>
+  </p:cSld>
+  <p:clrMapOvr>
+    <a:masterClrMapping/>
+  </p:clrMapOvr>
+</p:sld>
+</file>
+
 <file path=ppt/theme/theme1.xml><?xml version="1.0" encoding="utf-8"?>
 <a:theme xmlns:a="http://schemas.openxmlformats.org/drawingml/2006/main" name="Office Theme">
   <a:themeElements>

</xml_diff>